<commit_message>
Added final source slide deck
</commit_message>
<xml_diff>
--- a/COMP140/08/2019-20-COMP140-08-lecture.pptx
+++ b/COMP140/08/2019-20-COMP140-08-lecture.pptx
@@ -7385,18 +7385,18 @@
           </a:p>
           <a:p>
             <a:r>
-              <a:rPr lang="en-GB">
+              <a:rPr lang="en-GB" dirty="0">
                 <a:effectLst/>
               </a:rPr>
               <a:t>Optimising Graphics – </a:t>
             </a:r>
             <a:r>
-              <a:rPr lang="en-GB">
+              <a:rPr lang="en-GB" dirty="0">
                 <a:hlinkClick r:id="rId3"/>
               </a:rPr>
               <a:t>https://create.unity3d.com/Unity-UI-optimization-tips</a:t>
             </a:r>
-            <a:endParaRPr lang="en-GB">
+            <a:endParaRPr lang="en-GB" dirty="0">
               <a:effectLst/>
             </a:endParaRPr>
           </a:p>

</xml_diff>

<commit_message>
Added link to profiling topics
</commit_message>
<xml_diff>
--- a/COMP140/08/2019-20-COMP140-08-lecture.pptx
+++ b/COMP140/08/2019-20-COMP140-08-lecture.pptx
@@ -5,10 +5,10 @@
     <p:sldMasterId id="2147483648" r:id="rId1"/>
   </p:sldMasterIdLst>
   <p:notesMasterIdLst>
-    <p:notesMasterId r:id="rId28"/>
+    <p:notesMasterId r:id="rId29"/>
   </p:notesMasterIdLst>
   <p:handoutMasterIdLst>
-    <p:handoutMasterId r:id="rId29"/>
+    <p:handoutMasterId r:id="rId30"/>
   </p:handoutMasterIdLst>
   <p:sldIdLst>
     <p:sldId id="257" r:id="rId2"/>
@@ -37,6 +37,7 @@
     <p:sldId id="326" r:id="rId25"/>
     <p:sldId id="325" r:id="rId26"/>
     <p:sldId id="317" r:id="rId27"/>
+    <p:sldId id="327" r:id="rId28"/>
   </p:sldIdLst>
   <p:sldSz cx="9144000" cy="6858000" type="screen4x3"/>
   <p:notesSz cx="7315200" cy="9601200"/>
@@ -166,6 +167,7 @@
             <p14:sldId id="326"/>
             <p14:sldId id="325"/>
             <p14:sldId id="317"/>
+            <p14:sldId id="327"/>
           </p14:sldIdLst>
         </p14:section>
       </p14:sectionLst>
@@ -7595,6 +7597,140 @@
     <p:extLst>
       <p:ext uri="{BB962C8B-B14F-4D97-AF65-F5344CB8AC3E}">
         <p14:creationId xmlns:p14="http://schemas.microsoft.com/office/powerpoint/2010/main" val="2979567660"/>
+      </p:ext>
+    </p:extLst>
+  </p:cSld>
+  <p:clrMapOvr>
+    <a:masterClrMapping/>
+  </p:clrMapOvr>
+</p:sld>
+</file>
+
+<file path=ppt/slides/slide27.xml><?xml version="1.0" encoding="utf-8"?>
+<p:sld xmlns:a="http://schemas.openxmlformats.org/drawingml/2006/main" xmlns:r="http://schemas.openxmlformats.org/officeDocument/2006/relationships" xmlns:p="http://schemas.openxmlformats.org/presentationml/2006/main">
+  <p:cSld>
+    <p:spTree>
+      <p:nvGrpSpPr>
+        <p:cNvPr id="1" name=""/>
+        <p:cNvGrpSpPr/>
+        <p:nvPr/>
+      </p:nvGrpSpPr>
+      <p:grpSpPr>
+        <a:xfrm>
+          <a:off x="0" y="0"/>
+          <a:ext cx="0" cy="0"/>
+          <a:chOff x="0" y="0"/>
+          <a:chExt cx="0" cy="0"/>
+        </a:xfrm>
+      </p:grpSpPr>
+      <p:sp>
+        <p:nvSpPr>
+          <p:cNvPr id="2" name="Title 1">
+            <a:extLst>
+              <a:ext uri="{FF2B5EF4-FFF2-40B4-BE49-F238E27FC236}">
+                <a16:creationId xmlns:a16="http://schemas.microsoft.com/office/drawing/2014/main" id="{DA1EABA9-ECE4-ED45-96AD-D11605468DF1}"/>
+              </a:ext>
+            </a:extLst>
+          </p:cNvPr>
+          <p:cNvSpPr>
+            <a:spLocks noGrp="1"/>
+          </p:cNvSpPr>
+          <p:nvPr>
+            <p:ph type="title"/>
+          </p:nvPr>
+        </p:nvSpPr>
+        <p:spPr>
+          <a:xfrm>
+            <a:off x="457200" y="548680"/>
+            <a:ext cx="8229600" cy="634082"/>
+          </a:xfrm>
+        </p:spPr>
+        <p:txBody>
+          <a:bodyPr/>
+          <a:lstStyle/>
+          <a:p>
+            <a:r>
+              <a:rPr lang="en-GB" sz="4000" dirty="0">
+                <a:solidFill>
+                  <a:srgbClr val="FFFFFF"/>
+                </a:solidFill>
+                <a:latin typeface="URWGothicL"/>
+              </a:rPr>
+              <a:t>Profiler</a:t>
+            </a:r>
+            <a:endParaRPr lang="en-US" sz="4000" dirty="0"/>
+          </a:p>
+        </p:txBody>
+      </p:sp>
+      <p:sp>
+        <p:nvSpPr>
+          <p:cNvPr id="3" name="Content Placeholder 2">
+            <a:extLst>
+              <a:ext uri="{FF2B5EF4-FFF2-40B4-BE49-F238E27FC236}">
+                <a16:creationId xmlns:a16="http://schemas.microsoft.com/office/drawing/2014/main" id="{F11D3774-F227-E54D-8B35-5A75C345CFD0}"/>
+              </a:ext>
+            </a:extLst>
+          </p:cNvPr>
+          <p:cNvSpPr>
+            <a:spLocks noGrp="1"/>
+          </p:cNvSpPr>
+          <p:nvPr>
+            <p:ph idx="1"/>
+          </p:nvPr>
+        </p:nvSpPr>
+        <p:spPr>
+          <a:xfrm>
+            <a:off x="457200" y="1844824"/>
+            <a:ext cx="8229600" cy="5217443"/>
+          </a:xfrm>
+        </p:spPr>
+        <p:txBody>
+          <a:bodyPr anchor="ctr">
+            <a:normAutofit/>
+          </a:bodyPr>
+          <a:lstStyle/>
+          <a:p>
+            <a:r>
+              <a:rPr lang="en-GB" dirty="0"/>
+              <a:t>Profiling in Unity - </a:t>
+            </a:r>
+            <a:r>
+              <a:rPr lang="en-GB" dirty="0">
+                <a:hlinkClick r:id="rId2"/>
+              </a:rPr>
+              <a:t>https://learn.unity.com/tutorial/profiling-applications-made-with-unity</a:t>
+            </a:r>
+            <a:endParaRPr lang="en-GB" dirty="0"/>
+          </a:p>
+          <a:p>
+            <a:r>
+              <a:rPr lang="en-GB" dirty="0"/>
+              <a:t>Practical Guide to </a:t>
+            </a:r>
+            <a:r>
+              <a:rPr lang="en-GB"/>
+              <a:t>Profiling in Unity - </a:t>
+            </a:r>
+            <a:r>
+              <a:rPr lang="en-GB">
+                <a:hlinkClick r:id="rId3"/>
+              </a:rPr>
+              <a:t>https://www.youtube.com/watch?v=OSlOwJP8Z14</a:t>
+            </a:r>
+            <a:r>
+              <a:rPr lang="en-GB"/>
+              <a:t> </a:t>
+            </a:r>
+            <a:endParaRPr lang="en-GB" dirty="0">
+              <a:effectLst/>
+            </a:endParaRPr>
+          </a:p>
+        </p:txBody>
+      </p:sp>
+    </p:spTree>
+    <p:extLst>
+      <p:ext uri="{BB962C8B-B14F-4D97-AF65-F5344CB8AC3E}">
+        <p14:creationId xmlns:p14="http://schemas.microsoft.com/office/powerpoint/2010/main" val="2560986268"/>
       </p:ext>
     </p:extLst>
   </p:cSld>

</xml_diff>

<commit_message>
Added in links for Profiling Project
</commit_message>
<xml_diff>
--- a/COMP140/08/2019-20-COMP140-08-lecture.pptx
+++ b/COMP140/08/2019-20-COMP140-08-lecture.pptx
@@ -35,9 +35,9 @@
     <p:sldId id="323" r:id="rId23"/>
     <p:sldId id="324" r:id="rId24"/>
     <p:sldId id="326" r:id="rId25"/>
-    <p:sldId id="325" r:id="rId26"/>
-    <p:sldId id="317" r:id="rId27"/>
-    <p:sldId id="327" r:id="rId28"/>
+    <p:sldId id="317" r:id="rId26"/>
+    <p:sldId id="327" r:id="rId27"/>
+    <p:sldId id="328" r:id="rId28"/>
   </p:sldIdLst>
   <p:sldSz cx="9144000" cy="6858000" type="screen4x3"/>
   <p:notesSz cx="7315200" cy="9601200"/>
@@ -165,9 +165,9 @@
             <p14:sldId id="323"/>
             <p14:sldId id="324"/>
             <p14:sldId id="326"/>
-            <p14:sldId id="325"/>
             <p14:sldId id="317"/>
             <p14:sldId id="327"/>
+            <p14:sldId id="328"/>
           </p14:sldIdLst>
         </p14:section>
       </p14:sectionLst>
@@ -7326,7 +7326,7 @@
                 </a:solidFill>
                 <a:latin typeface="URWGothicL"/>
               </a:rPr>
-              <a:t>More Garbage Collection Tips</a:t>
+              <a:t>Unity Optimisation Tips</a:t>
             </a:r>
             <a:endParaRPr lang="en-US" sz="4000" dirty="0"/>
           </a:p>
@@ -7439,7 +7439,7 @@
           <p:cNvPr id="2" name="Title 1">
             <a:extLst>
               <a:ext uri="{FF2B5EF4-FFF2-40B4-BE49-F238E27FC236}">
-                <a16:creationId xmlns:a16="http://schemas.microsoft.com/office/drawing/2014/main" id="{DA1EABA9-ECE4-ED45-96AD-D11605468DF1}"/>
+                <a16:creationId xmlns:a16="http://schemas.microsoft.com/office/drawing/2014/main" id="{E0D39B9B-57E0-4C75-9D4A-053BECB31981}"/>
               </a:ext>
             </a:extLst>
           </p:cNvPr>
@@ -7452,8 +7452,8 @@
         </p:nvSpPr>
         <p:spPr>
           <a:xfrm>
-            <a:off x="457200" y="548680"/>
-            <a:ext cx="8229600" cy="634082"/>
+            <a:off x="2195736" y="3088481"/>
+            <a:ext cx="4752528" cy="681038"/>
           </a:xfrm>
         </p:spPr>
         <p:txBody>
@@ -7461,79 +7461,16 @@
           <a:lstStyle/>
           <a:p>
             <a:r>
-              <a:rPr lang="en-GB" sz="4000" dirty="0">
-                <a:solidFill>
-                  <a:srgbClr val="FFFFFF"/>
-                </a:solidFill>
-                <a:latin typeface="URWGothicL"/>
-              </a:rPr>
-              <a:t>Garbage Collection</a:t>
-            </a:r>
-            <a:endParaRPr lang="en-US" sz="4000" dirty="0"/>
-          </a:p>
-        </p:txBody>
-      </p:sp>
-      <p:sp>
-        <p:nvSpPr>
-          <p:cNvPr id="3" name="Content Placeholder 2">
-            <a:extLst>
-              <a:ext uri="{FF2B5EF4-FFF2-40B4-BE49-F238E27FC236}">
-                <a16:creationId xmlns:a16="http://schemas.microsoft.com/office/drawing/2014/main" id="{F11D3774-F227-E54D-8B35-5A75C345CFD0}"/>
-              </a:ext>
-            </a:extLst>
-          </p:cNvPr>
-          <p:cNvSpPr>
-            <a:spLocks noGrp="1"/>
-          </p:cNvSpPr>
-          <p:nvPr>
-            <p:ph idx="1"/>
-          </p:nvPr>
-        </p:nvSpPr>
-        <p:spPr>
-          <a:xfrm>
-            <a:off x="457200" y="1484784"/>
-            <a:ext cx="8229600" cy="5217443"/>
-          </a:xfrm>
-        </p:spPr>
-        <p:txBody>
-          <a:bodyPr anchor="ctr">
-            <a:normAutofit lnSpcReduction="10000"/>
-          </a:bodyPr>
-          <a:lstStyle/>
-          <a:p>
-            <a:r>
-              <a:rPr lang="en-GB" sz="3600" dirty="0"/>
-              <a:t>C# uses garbage collection to clean up deallocated objects that have been allocated on the heap</a:t>
-            </a:r>
-          </a:p>
-          <a:p>
-            <a:r>
-              <a:rPr lang="en-GB" sz="3600" dirty="0"/>
-              <a:t>This is an automatic process and has been tuned for maximum performance</a:t>
-            </a:r>
-          </a:p>
-          <a:p>
-            <a:r>
-              <a:rPr lang="en-GB" sz="3600" b="1" dirty="0"/>
-              <a:t>However</a:t>
-            </a:r>
-            <a:r>
-              <a:rPr lang="en-GB" sz="3600" dirty="0"/>
-              <a:t> you should understand how this process works and create code which ensures that garbage collection only runs when needed</a:t>
-            </a:r>
-            <a:endParaRPr lang="en-GB" sz="3600" b="1" dirty="0"/>
-          </a:p>
-          <a:p>
-            <a:endParaRPr lang="en-GB" dirty="0">
-              <a:effectLst/>
-            </a:endParaRPr>
+              <a:rPr lang="en-GB" dirty="0"/>
+              <a:t>Profiler Live Demo</a:t>
+            </a:r>
           </a:p>
         </p:txBody>
       </p:sp>
     </p:spTree>
     <p:extLst>
       <p:ext uri="{BB962C8B-B14F-4D97-AF65-F5344CB8AC3E}">
-        <p14:creationId xmlns:p14="http://schemas.microsoft.com/office/powerpoint/2010/main" val="1338107229"/>
+        <p14:creationId xmlns:p14="http://schemas.microsoft.com/office/powerpoint/2010/main" val="2979567660"/>
       </p:ext>
     </p:extLst>
   </p:cSld>
@@ -7565,7 +7502,7 @@
           <p:cNvPr id="2" name="Title 1">
             <a:extLst>
               <a:ext uri="{FF2B5EF4-FFF2-40B4-BE49-F238E27FC236}">
-                <a16:creationId xmlns:a16="http://schemas.microsoft.com/office/drawing/2014/main" id="{E0D39B9B-57E0-4C75-9D4A-053BECB31981}"/>
+                <a16:creationId xmlns:a16="http://schemas.microsoft.com/office/drawing/2014/main" id="{DA1EABA9-ECE4-ED45-96AD-D11605468DF1}"/>
               </a:ext>
             </a:extLst>
           </p:cNvPr>
@@ -7578,8 +7515,8 @@
         </p:nvSpPr>
         <p:spPr>
           <a:xfrm>
-            <a:off x="2195736" y="3088481"/>
-            <a:ext cx="4752528" cy="681038"/>
+            <a:off x="457200" y="548680"/>
+            <a:ext cx="8229600" cy="634082"/>
           </a:xfrm>
         </p:spPr>
         <p:txBody>
@@ -7587,16 +7524,64 @@
           <a:lstStyle/>
           <a:p>
             <a:r>
+              <a:rPr lang="en-GB" sz="4000" dirty="0">
+                <a:solidFill>
+                  <a:srgbClr val="FFFFFF"/>
+                </a:solidFill>
+                <a:latin typeface="URWGothicL"/>
+              </a:rPr>
+              <a:t>Profiler</a:t>
+            </a:r>
+            <a:endParaRPr lang="en-US" sz="4000" dirty="0"/>
+          </a:p>
+        </p:txBody>
+      </p:sp>
+      <p:sp>
+        <p:nvSpPr>
+          <p:cNvPr id="3" name="Content Placeholder 2">
+            <a:extLst>
+              <a:ext uri="{FF2B5EF4-FFF2-40B4-BE49-F238E27FC236}">
+                <a16:creationId xmlns:a16="http://schemas.microsoft.com/office/drawing/2014/main" id="{F11D3774-F227-E54D-8B35-5A75C345CFD0}"/>
+              </a:ext>
+            </a:extLst>
+          </p:cNvPr>
+          <p:cNvSpPr>
+            <a:spLocks noGrp="1"/>
+          </p:cNvSpPr>
+          <p:nvPr>
+            <p:ph idx="1"/>
+          </p:nvPr>
+        </p:nvSpPr>
+        <p:spPr>
+          <a:xfrm>
+            <a:off x="457200" y="1844824"/>
+            <a:ext cx="8229600" cy="5217443"/>
+          </a:xfrm>
+        </p:spPr>
+        <p:txBody>
+          <a:bodyPr anchor="ctr">
+            <a:normAutofit/>
+          </a:bodyPr>
+          <a:lstStyle/>
+          <a:p>
+            <a:r>
               <a:rPr lang="en-GB" dirty="0"/>
-              <a:t>Profiler Live Demo</a:t>
-            </a:r>
+              <a:t>Test Project - </a:t>
+            </a:r>
+            <a:r>
+              <a:rPr lang="en-GB" dirty="0">
+                <a:hlinkClick r:id="rId2"/>
+              </a:rPr>
+              <a:t>https://github.com/Falmouth-Games-Academy/COMP140-Profiler-Test</a:t>
+            </a:r>
+            <a:endParaRPr lang="en-GB" dirty="0"/>
           </a:p>
         </p:txBody>
       </p:sp>
     </p:spTree>
     <p:extLst>
       <p:ext uri="{BB962C8B-B14F-4D97-AF65-F5344CB8AC3E}">
-        <p14:creationId xmlns:p14="http://schemas.microsoft.com/office/powerpoint/2010/main" val="2979567660"/>
+        <p14:creationId xmlns:p14="http://schemas.microsoft.com/office/powerpoint/2010/main" val="2560986268"/>
       </p:ext>
     </p:extLst>
   </p:cSld>
@@ -7656,7 +7641,7 @@
                 </a:solidFill>
                 <a:latin typeface="URWGothicL"/>
               </a:rPr>
-              <a:t>Profiler</a:t>
+              <a:t>Profiler – Additional Reading</a:t>
             </a:r>
             <a:endParaRPr lang="en-US" sz="4000" dirty="0"/>
           </a:p>
@@ -7705,20 +7690,16 @@
           <a:p>
             <a:r>
               <a:rPr lang="en-GB" dirty="0"/>
-              <a:t>Practical Guide to </a:t>
-            </a:r>
-            <a:r>
-              <a:rPr lang="en-GB"/>
-              <a:t>Profiling in Unity - </a:t>
-            </a:r>
-            <a:r>
-              <a:rPr lang="en-GB">
+              <a:t>Practical Guide to Profiling in Unity - </a:t>
+            </a:r>
+            <a:r>
+              <a:rPr lang="en-GB" dirty="0">
                 <a:hlinkClick r:id="rId3"/>
               </a:rPr>
               <a:t>https://www.youtube.com/watch?v=OSlOwJP8Z14</a:t>
             </a:r>
             <a:r>
-              <a:rPr lang="en-GB"/>
+              <a:rPr lang="en-GB" dirty="0"/>
               <a:t> </a:t>
             </a:r>
             <a:endParaRPr lang="en-GB" dirty="0">
@@ -7730,7 +7711,7 @@
     </p:spTree>
     <p:extLst>
       <p:ext uri="{BB962C8B-B14F-4D97-AF65-F5344CB8AC3E}">
-        <p14:creationId xmlns:p14="http://schemas.microsoft.com/office/powerpoint/2010/main" val="2560986268"/>
+        <p14:creationId xmlns:p14="http://schemas.microsoft.com/office/powerpoint/2010/main" val="2449291768"/>
       </p:ext>
     </p:extLst>
   </p:cSld>

</xml_diff>